<commit_message>
Updated code files - PK
</commit_message>
<xml_diff>
--- a/CRC Cards/Team 64 - CRC cards - shared.pptx
+++ b/CRC Cards/Team 64 - CRC cards - shared.pptx
@@ -24809,7 +24809,7 @@
               <a:buNone/>
             </a:pPr>
             <a:r>
-              <a:rPr lang="en-US" sz="1800">
+              <a:rPr lang="en-US" sz="1800" dirty="0">
                 <a:solidFill>
                   <a:schemeClr val="lt1"/>
                 </a:solidFill>
@@ -24820,7 +24820,7 @@
               </a:rPr>
               <a:t>Class</a:t>
             </a:r>
-            <a:endParaRPr/>
+            <a:endParaRPr dirty="0"/>
           </a:p>
         </p:txBody>
       </p:sp>
@@ -25781,7 +25781,7 @@
               <a:buNone/>
             </a:pPr>
             <a:r>
-              <a:rPr lang="en-US" sz="1800" b="1" u="sng">
+              <a:rPr lang="en-US" sz="1800" b="1" u="sng" dirty="0">
                 <a:solidFill>
                   <a:schemeClr val="dk1"/>
                 </a:solidFill>
@@ -25790,9 +25790,33 @@
                 <a:cs typeface="Calibri"/>
                 <a:sym typeface="Calibri"/>
               </a:rPr>
-              <a:t>Responsibility(ies):</a:t>
+              <a:t>Responsibility(</a:t>
             </a:r>
-            <a:endParaRPr/>
+            <a:r>
+              <a:rPr lang="en-US" sz="1800" b="1" u="sng" dirty="0" err="1">
+                <a:solidFill>
+                  <a:schemeClr val="dk1"/>
+                </a:solidFill>
+                <a:latin typeface="Calibri"/>
+                <a:ea typeface="Calibri"/>
+                <a:cs typeface="Calibri"/>
+                <a:sym typeface="Calibri"/>
+              </a:rPr>
+              <a:t>ies</a:t>
+            </a:r>
+            <a:r>
+              <a:rPr lang="en-US" sz="1800" b="1" u="sng" dirty="0">
+                <a:solidFill>
+                  <a:schemeClr val="dk1"/>
+                </a:solidFill>
+                <a:latin typeface="Calibri"/>
+                <a:ea typeface="Calibri"/>
+                <a:cs typeface="Calibri"/>
+                <a:sym typeface="Calibri"/>
+              </a:rPr>
+              <a:t>):</a:t>
+            </a:r>
+            <a:endParaRPr dirty="0"/>
           </a:p>
           <a:p>
             <a:pPr marL="285750" marR="0" lvl="0" indent="-285750" algn="l" rtl="0">
@@ -25810,7 +25834,7 @@
               <a:buChar char="•"/>
             </a:pPr>
             <a:r>
-              <a:rPr lang="en-US" sz="1800">
+              <a:rPr lang="en-US" sz="1800" dirty="0">
                 <a:solidFill>
                   <a:schemeClr val="dk1"/>
                 </a:solidFill>
@@ -25821,7 +25845,7 @@
               </a:rPr>
               <a:t>Initiate game</a:t>
             </a:r>
-            <a:endParaRPr/>
+            <a:endParaRPr dirty="0"/>
           </a:p>
           <a:p>
             <a:pPr marL="285750" marR="0" lvl="0" indent="-285750" algn="l" rtl="0">
@@ -25848,27 +25872,10 @@
                 <a:cs typeface="Calibri"/>
                 <a:sym typeface="Calibri"/>
               </a:rPr>
-              <a:t>Initiate moves</a:t>
+              <a:t>Initiate </a:t>
             </a:r>
-            <a:endParaRPr/>
-          </a:p>
-          <a:p>
-            <a:pPr marL="285750" marR="0" lvl="0" indent="-285750" algn="l" rtl="0">
-              <a:spcBef>
-                <a:spcPts val="0"/>
-              </a:spcBef>
-              <a:spcAft>
-                <a:spcPts val="0"/>
-              </a:spcAft>
-              <a:buClr>
-                <a:schemeClr val="dk1"/>
-              </a:buClr>
-              <a:buSzPts val="1800"/>
-              <a:buFont typeface="Arial"/>
-              <a:buChar char="•"/>
-            </a:pPr>
             <a:r>
-              <a:rPr lang="en-US" sz="1800">
+              <a:rPr lang="en-US" sz="1800" smtClean="0">
                 <a:solidFill>
                   <a:schemeClr val="dk1"/>
                 </a:solidFill>
@@ -25877,9 +25884,9 @@
                 <a:cs typeface="Calibri"/>
                 <a:sym typeface="Calibri"/>
               </a:rPr>
-              <a:t> </a:t>
+              <a:t>moves</a:t>
             </a:r>
-            <a:endParaRPr/>
+            <a:endParaRPr dirty="0"/>
           </a:p>
         </p:txBody>
       </p:sp>

</xml_diff>